<commit_message>
Help is finished! For now...
</commit_message>
<xml_diff>
--- a/rsrc/dreamsdk.pptx
+++ b/rsrc/dreamsdk.pptx
@@ -6,6 +6,7 @@
   </p:sldMasterIdLst>
   <p:sldIdLst>
     <p:sldId id="256" r:id="rId2"/>
+    <p:sldId id="257" r:id="rId3"/>
   </p:sldIdLst>
   <p:sldSz cx="12192000" cy="6858000"/>
   <p:notesSz cx="6858000" cy="9144000"/>
@@ -259,7 +260,7 @@
           <a:p>
             <a:fld id="{2AF15FF3-8856-4AE4-97CF-0F91F701267A}" type="datetimeFigureOut">
               <a:rPr lang="fr-FR" smtClean="0"/>
-              <a:t>14/11/2018</a:t>
+              <a:t>19/11/2018</a:t>
             </a:fld>
             <a:endParaRPr lang="fr-FR" dirty="0"/>
           </a:p>
@@ -457,7 +458,7 @@
           <a:p>
             <a:fld id="{2AF15FF3-8856-4AE4-97CF-0F91F701267A}" type="datetimeFigureOut">
               <a:rPr lang="fr-FR" smtClean="0"/>
-              <a:t>14/11/2018</a:t>
+              <a:t>19/11/2018</a:t>
             </a:fld>
             <a:endParaRPr lang="fr-FR" dirty="0"/>
           </a:p>
@@ -665,7 +666,7 @@
           <a:p>
             <a:fld id="{2AF15FF3-8856-4AE4-97CF-0F91F701267A}" type="datetimeFigureOut">
               <a:rPr lang="fr-FR" smtClean="0"/>
-              <a:t>14/11/2018</a:t>
+              <a:t>19/11/2018</a:t>
             </a:fld>
             <a:endParaRPr lang="fr-FR" dirty="0"/>
           </a:p>
@@ -863,7 +864,7 @@
           <a:p>
             <a:fld id="{2AF15FF3-8856-4AE4-97CF-0F91F701267A}" type="datetimeFigureOut">
               <a:rPr lang="fr-FR" smtClean="0"/>
-              <a:t>14/11/2018</a:t>
+              <a:t>19/11/2018</a:t>
             </a:fld>
             <a:endParaRPr lang="fr-FR" dirty="0"/>
           </a:p>
@@ -1138,7 +1139,7 @@
           <a:p>
             <a:fld id="{2AF15FF3-8856-4AE4-97CF-0F91F701267A}" type="datetimeFigureOut">
               <a:rPr lang="fr-FR" smtClean="0"/>
-              <a:t>14/11/2018</a:t>
+              <a:t>19/11/2018</a:t>
             </a:fld>
             <a:endParaRPr lang="fr-FR" dirty="0"/>
           </a:p>
@@ -1403,7 +1404,7 @@
           <a:p>
             <a:fld id="{2AF15FF3-8856-4AE4-97CF-0F91F701267A}" type="datetimeFigureOut">
               <a:rPr lang="fr-FR" smtClean="0"/>
-              <a:t>14/11/2018</a:t>
+              <a:t>19/11/2018</a:t>
             </a:fld>
             <a:endParaRPr lang="fr-FR" dirty="0"/>
           </a:p>
@@ -1815,7 +1816,7 @@
           <a:p>
             <a:fld id="{2AF15FF3-8856-4AE4-97CF-0F91F701267A}" type="datetimeFigureOut">
               <a:rPr lang="fr-FR" smtClean="0"/>
-              <a:t>14/11/2018</a:t>
+              <a:t>19/11/2018</a:t>
             </a:fld>
             <a:endParaRPr lang="fr-FR" dirty="0"/>
           </a:p>
@@ -1956,7 +1957,7 @@
           <a:p>
             <a:fld id="{2AF15FF3-8856-4AE4-97CF-0F91F701267A}" type="datetimeFigureOut">
               <a:rPr lang="fr-FR" smtClean="0"/>
-              <a:t>14/11/2018</a:t>
+              <a:t>19/11/2018</a:t>
             </a:fld>
             <a:endParaRPr lang="fr-FR" dirty="0"/>
           </a:p>
@@ -2069,7 +2070,7 @@
           <a:p>
             <a:fld id="{2AF15FF3-8856-4AE4-97CF-0F91F701267A}" type="datetimeFigureOut">
               <a:rPr lang="fr-FR" smtClean="0"/>
-              <a:t>14/11/2018</a:t>
+              <a:t>19/11/2018</a:t>
             </a:fld>
             <a:endParaRPr lang="fr-FR" dirty="0"/>
           </a:p>
@@ -2380,7 +2381,7 @@
           <a:p>
             <a:fld id="{2AF15FF3-8856-4AE4-97CF-0F91F701267A}" type="datetimeFigureOut">
               <a:rPr lang="fr-FR" smtClean="0"/>
-              <a:t>14/11/2018</a:t>
+              <a:t>19/11/2018</a:t>
             </a:fld>
             <a:endParaRPr lang="fr-FR" dirty="0"/>
           </a:p>
@@ -2668,7 +2669,7 @@
           <a:p>
             <a:fld id="{2AF15FF3-8856-4AE4-97CF-0F91F701267A}" type="datetimeFigureOut">
               <a:rPr lang="fr-FR" smtClean="0"/>
-              <a:t>14/11/2018</a:t>
+              <a:t>19/11/2018</a:t>
             </a:fld>
             <a:endParaRPr lang="fr-FR" dirty="0"/>
           </a:p>
@@ -2909,7 +2910,7 @@
           <a:p>
             <a:fld id="{2AF15FF3-8856-4AE4-97CF-0F91F701267A}" type="datetimeFigureOut">
               <a:rPr lang="fr-FR" smtClean="0"/>
-              <a:t>14/11/2018</a:t>
+              <a:t>19/11/2018</a:t>
             </a:fld>
             <a:endParaRPr lang="fr-FR" dirty="0"/>
           </a:p>
@@ -3995,6 +3996,782 @@
 </p:sld>
 </file>
 
+<file path=ppt/slides/slide2.xml><?xml version="1.0" encoding="utf-8"?>
+<p:sld xmlns:a="http://schemas.openxmlformats.org/drawingml/2006/main" xmlns:r="http://schemas.openxmlformats.org/officeDocument/2006/relationships" xmlns:p="http://schemas.openxmlformats.org/presentationml/2006/main">
+  <p:cSld>
+    <p:spTree>
+      <p:nvGrpSpPr>
+        <p:cNvPr id="1" name=""/>
+        <p:cNvGrpSpPr/>
+        <p:nvPr/>
+      </p:nvGrpSpPr>
+      <p:grpSpPr>
+        <a:xfrm>
+          <a:off x="0" y="0"/>
+          <a:ext cx="0" cy="0"/>
+          <a:chOff x="0" y="0"/>
+          <a:chExt cx="0" cy="0"/>
+        </a:xfrm>
+      </p:grpSpPr>
+      <p:sp>
+        <p:nvSpPr>
+          <p:cNvPr id="4" name="Rectangle 3">
+            <a:extLst>
+              <a:ext uri="{FF2B5EF4-FFF2-40B4-BE49-F238E27FC236}">
+                <a16:creationId xmlns:a16="http://schemas.microsoft.com/office/drawing/2014/main" id="{DE6DC33B-A966-41D7-B714-981F5D53E932}"/>
+              </a:ext>
+            </a:extLst>
+          </p:cNvPr>
+          <p:cNvSpPr/>
+          <p:nvPr/>
+        </p:nvSpPr>
+        <p:spPr>
+          <a:xfrm>
+            <a:off x="209549" y="1658097"/>
+            <a:ext cx="5138487" cy="782432"/>
+          </a:xfrm>
+          <a:prstGeom prst="rect">
+            <a:avLst/>
+          </a:prstGeom>
+        </p:spPr>
+        <p:style>
+          <a:lnRef idx="0">
+            <a:schemeClr val="accent1"/>
+          </a:lnRef>
+          <a:fillRef idx="3">
+            <a:schemeClr val="accent1"/>
+          </a:fillRef>
+          <a:effectRef idx="3">
+            <a:schemeClr val="accent1"/>
+          </a:effectRef>
+          <a:fontRef idx="minor">
+            <a:schemeClr val="lt1"/>
+          </a:fontRef>
+        </p:style>
+        <p:txBody>
+          <a:bodyPr rtlCol="0" anchor="ctr"/>
+          <a:lstStyle/>
+          <a:p>
+            <a:pPr algn="ctr"/>
+            <a:r>
+              <a:rPr lang="fr-FR" b="1" noProof="1">
+                <a:effectLst>
+                  <a:outerShdw blurRad="38100" dist="38100" dir="2700000" algn="tl">
+                    <a:srgbClr val="000000">
+                      <a:alpha val="43137"/>
+                    </a:srgbClr>
+                  </a:outerShdw>
+                </a:effectLst>
+              </a:rPr>
+              <a:t>Compiler Output (Binary)</a:t>
+            </a:r>
+            <a:endParaRPr lang="fr-FR" sz="1200" noProof="1"/>
+          </a:p>
+          <a:p>
+            <a:pPr algn="ctr"/>
+            <a:r>
+              <a:rPr lang="fr-FR" sz="1200" noProof="1">
+                <a:latin typeface="Courier New" panose="02070309020205020404" pitchFamily="49" charset="0"/>
+                <a:cs typeface="Courier New" panose="02070309020205020404" pitchFamily="49" charset="0"/>
+              </a:rPr>
+              <a:t>yourprog.elf</a:t>
+            </a:r>
+          </a:p>
+        </p:txBody>
+      </p:sp>
+      <p:sp>
+        <p:nvSpPr>
+          <p:cNvPr id="5" name="Rectangle 4">
+            <a:extLst>
+              <a:ext uri="{FF2B5EF4-FFF2-40B4-BE49-F238E27FC236}">
+                <a16:creationId xmlns:a16="http://schemas.microsoft.com/office/drawing/2014/main" id="{FB2F4361-B781-4814-81BC-DA2207FF5FC0}"/>
+              </a:ext>
+            </a:extLst>
+          </p:cNvPr>
+          <p:cNvSpPr/>
+          <p:nvPr/>
+        </p:nvSpPr>
+        <p:spPr>
+          <a:xfrm>
+            <a:off x="209548" y="3135661"/>
+            <a:ext cx="5138487" cy="782432"/>
+          </a:xfrm>
+          <a:prstGeom prst="rect">
+            <a:avLst/>
+          </a:prstGeom>
+        </p:spPr>
+        <p:style>
+          <a:lnRef idx="0">
+            <a:schemeClr val="accent1"/>
+          </a:lnRef>
+          <a:fillRef idx="3">
+            <a:schemeClr val="accent1"/>
+          </a:fillRef>
+          <a:effectRef idx="3">
+            <a:schemeClr val="accent1"/>
+          </a:effectRef>
+          <a:fontRef idx="minor">
+            <a:schemeClr val="lt1"/>
+          </a:fontRef>
+        </p:style>
+        <p:txBody>
+          <a:bodyPr rtlCol="0" anchor="ctr"/>
+          <a:lstStyle/>
+          <a:p>
+            <a:pPr algn="ctr"/>
+            <a:r>
+              <a:rPr lang="fr-FR" b="1" noProof="1">
+                <a:effectLst>
+                  <a:outerShdw blurRad="38100" dist="38100" dir="2700000" algn="tl">
+                    <a:srgbClr val="000000">
+                      <a:alpha val="43137"/>
+                    </a:srgbClr>
+                  </a:outerShdw>
+                </a:effectLst>
+              </a:rPr>
+              <a:t>Raw Binary (without </a:t>
+            </a:r>
+            <a:r>
+              <a:rPr lang="fr-FR" b="1" noProof="1">
+                <a:effectLst>
+                  <a:outerShdw blurRad="38100" dist="38100" dir="2700000" algn="tl">
+                    <a:srgbClr val="000000">
+                      <a:alpha val="43137"/>
+                    </a:srgbClr>
+                  </a:outerShdw>
+                </a:effectLst>
+                <a:latin typeface="Courier New" panose="02070309020205020404" pitchFamily="49" charset="0"/>
+                <a:cs typeface="Courier New" panose="02070309020205020404" pitchFamily="49" charset="0"/>
+              </a:rPr>
+              <a:t>.ELF</a:t>
+            </a:r>
+            <a:r>
+              <a:rPr lang="fr-FR" b="1" noProof="1">
+                <a:effectLst>
+                  <a:outerShdw blurRad="38100" dist="38100" dir="2700000" algn="tl">
+                    <a:srgbClr val="000000">
+                      <a:alpha val="43137"/>
+                    </a:srgbClr>
+                  </a:outerShdw>
+                </a:effectLst>
+              </a:rPr>
+              <a:t> header)</a:t>
+            </a:r>
+            <a:endParaRPr lang="fr-FR" sz="1200" noProof="1"/>
+          </a:p>
+          <a:p>
+            <a:pPr algn="ctr"/>
+            <a:r>
+              <a:rPr lang="fr-FR" sz="1200" noProof="1">
+                <a:latin typeface="Courier New" panose="02070309020205020404" pitchFamily="49" charset="0"/>
+                <a:cs typeface="Courier New" panose="02070309020205020404" pitchFamily="49" charset="0"/>
+              </a:rPr>
+              <a:t>yourprog.bin</a:t>
+            </a:r>
+          </a:p>
+        </p:txBody>
+      </p:sp>
+      <p:sp>
+        <p:nvSpPr>
+          <p:cNvPr id="6" name="Rectangle 5">
+            <a:extLst>
+              <a:ext uri="{FF2B5EF4-FFF2-40B4-BE49-F238E27FC236}">
+                <a16:creationId xmlns:a16="http://schemas.microsoft.com/office/drawing/2014/main" id="{6B6E962B-670F-46B4-BC06-3E6A7FDBB563}"/>
+              </a:ext>
+            </a:extLst>
+          </p:cNvPr>
+          <p:cNvSpPr/>
+          <p:nvPr/>
+        </p:nvSpPr>
+        <p:spPr>
+          <a:xfrm>
+            <a:off x="209547" y="4650553"/>
+            <a:ext cx="5138487" cy="782432"/>
+          </a:xfrm>
+          <a:prstGeom prst="rect">
+            <a:avLst/>
+          </a:prstGeom>
+        </p:spPr>
+        <p:style>
+          <a:lnRef idx="0">
+            <a:schemeClr val="accent1"/>
+          </a:lnRef>
+          <a:fillRef idx="3">
+            <a:schemeClr val="accent1"/>
+          </a:fillRef>
+          <a:effectRef idx="3">
+            <a:schemeClr val="accent1"/>
+          </a:effectRef>
+          <a:fontRef idx="minor">
+            <a:schemeClr val="lt1"/>
+          </a:fontRef>
+        </p:style>
+        <p:txBody>
+          <a:bodyPr rtlCol="0" anchor="ctr"/>
+          <a:lstStyle/>
+          <a:p>
+            <a:pPr algn="ctr"/>
+            <a:r>
+              <a:rPr lang="fr-FR" b="1" noProof="1">
+                <a:effectLst>
+                  <a:outerShdw blurRad="38100" dist="38100" dir="2700000" algn="tl">
+                    <a:srgbClr val="000000">
+                      <a:alpha val="43137"/>
+                    </a:srgbClr>
+                  </a:outerShdw>
+                </a:effectLst>
+              </a:rPr>
+              <a:t>Scrambled Binary</a:t>
+            </a:r>
+            <a:endParaRPr lang="fr-FR" sz="1200" noProof="1"/>
+          </a:p>
+          <a:p>
+            <a:pPr algn="ctr"/>
+            <a:r>
+              <a:rPr lang="fr-FR" sz="1200" noProof="1">
+                <a:latin typeface="Courier New" panose="02070309020205020404" pitchFamily="49" charset="0"/>
+                <a:cs typeface="Courier New" panose="02070309020205020404" pitchFamily="49" charset="0"/>
+              </a:rPr>
+              <a:t>1ST_READ.BIN</a:t>
+            </a:r>
+          </a:p>
+        </p:txBody>
+      </p:sp>
+      <p:sp>
+        <p:nvSpPr>
+          <p:cNvPr id="7" name="Rectangle 6">
+            <a:extLst>
+              <a:ext uri="{FF2B5EF4-FFF2-40B4-BE49-F238E27FC236}">
+                <a16:creationId xmlns:a16="http://schemas.microsoft.com/office/drawing/2014/main" id="{8176627A-1AD2-4BEE-BF0D-BB96EA2BD7DB}"/>
+              </a:ext>
+            </a:extLst>
+          </p:cNvPr>
+          <p:cNvSpPr/>
+          <p:nvPr/>
+        </p:nvSpPr>
+        <p:spPr>
+          <a:xfrm>
+            <a:off x="5756104" y="4650553"/>
+            <a:ext cx="5138487" cy="782432"/>
+          </a:xfrm>
+          <a:prstGeom prst="rect">
+            <a:avLst/>
+          </a:prstGeom>
+        </p:spPr>
+        <p:style>
+          <a:lnRef idx="0">
+            <a:schemeClr val="accent4"/>
+          </a:lnRef>
+          <a:fillRef idx="3">
+            <a:schemeClr val="accent4"/>
+          </a:fillRef>
+          <a:effectRef idx="3">
+            <a:schemeClr val="accent4"/>
+          </a:effectRef>
+          <a:fontRef idx="minor">
+            <a:schemeClr val="lt1"/>
+          </a:fontRef>
+        </p:style>
+        <p:txBody>
+          <a:bodyPr rtlCol="0" anchor="ctr"/>
+          <a:lstStyle/>
+          <a:p>
+            <a:pPr algn="ctr"/>
+            <a:r>
+              <a:rPr lang="fr-FR" b="1" noProof="1">
+                <a:effectLst>
+                  <a:outerShdw blurRad="38100" dist="38100" dir="2700000" algn="tl">
+                    <a:srgbClr val="000000">
+                      <a:alpha val="43137"/>
+                    </a:srgbClr>
+                  </a:outerShdw>
+                </a:effectLst>
+              </a:rPr>
+              <a:t>Bootstrap Binary</a:t>
+            </a:r>
+            <a:endParaRPr lang="fr-FR" sz="1200" noProof="1"/>
+          </a:p>
+          <a:p>
+            <a:pPr algn="ctr"/>
+            <a:r>
+              <a:rPr lang="fr-FR" sz="1200" noProof="1">
+                <a:latin typeface="Courier New" panose="02070309020205020404" pitchFamily="49" charset="0"/>
+                <a:cs typeface="Courier New" panose="02070309020205020404" pitchFamily="49" charset="0"/>
+              </a:rPr>
+              <a:t>IP.BIN</a:t>
+            </a:r>
+          </a:p>
+        </p:txBody>
+      </p:sp>
+      <p:sp>
+        <p:nvSpPr>
+          <p:cNvPr id="8" name="Rectangle 7">
+            <a:extLst>
+              <a:ext uri="{FF2B5EF4-FFF2-40B4-BE49-F238E27FC236}">
+                <a16:creationId xmlns:a16="http://schemas.microsoft.com/office/drawing/2014/main" id="{1EF9183D-C4A4-453D-92DD-338D58E03052}"/>
+              </a:ext>
+            </a:extLst>
+          </p:cNvPr>
+          <p:cNvSpPr/>
+          <p:nvPr/>
+        </p:nvSpPr>
+        <p:spPr>
+          <a:xfrm>
+            <a:off x="209549" y="163512"/>
+            <a:ext cx="5138487" cy="782432"/>
+          </a:xfrm>
+          <a:prstGeom prst="rect">
+            <a:avLst/>
+          </a:prstGeom>
+        </p:spPr>
+        <p:style>
+          <a:lnRef idx="0">
+            <a:schemeClr val="accent1"/>
+          </a:lnRef>
+          <a:fillRef idx="3">
+            <a:schemeClr val="accent1"/>
+          </a:fillRef>
+          <a:effectRef idx="3">
+            <a:schemeClr val="accent1"/>
+          </a:effectRef>
+          <a:fontRef idx="minor">
+            <a:schemeClr val="lt1"/>
+          </a:fontRef>
+        </p:style>
+        <p:txBody>
+          <a:bodyPr rtlCol="0" anchor="ctr"/>
+          <a:lstStyle/>
+          <a:p>
+            <a:pPr algn="ctr"/>
+            <a:r>
+              <a:rPr lang="fr-FR" b="1" noProof="1">
+                <a:effectLst>
+                  <a:outerShdw blurRad="38100" dist="38100" dir="2700000" algn="tl">
+                    <a:srgbClr val="000000">
+                      <a:alpha val="43137"/>
+                    </a:srgbClr>
+                  </a:outerShdw>
+                </a:effectLst>
+              </a:rPr>
+              <a:t>Source Directory</a:t>
+            </a:r>
+            <a:endParaRPr lang="fr-FR" sz="1200" noProof="1"/>
+          </a:p>
+          <a:p>
+            <a:pPr algn="ctr"/>
+            <a:r>
+              <a:rPr lang="fr-FR" sz="1200" noProof="1">
+                <a:latin typeface="Courier New" panose="02070309020205020404" pitchFamily="49" charset="0"/>
+                <a:cs typeface="Courier New" panose="02070309020205020404" pitchFamily="49" charset="0"/>
+              </a:rPr>
+              <a:t>yourprog/</a:t>
+            </a:r>
+          </a:p>
+        </p:txBody>
+      </p:sp>
+      <p:sp>
+        <p:nvSpPr>
+          <p:cNvPr id="9" name="Flèche : droite 8">
+            <a:extLst>
+              <a:ext uri="{FF2B5EF4-FFF2-40B4-BE49-F238E27FC236}">
+                <a16:creationId xmlns:a16="http://schemas.microsoft.com/office/drawing/2014/main" id="{0541F894-6EA4-431E-9A58-EFD8ACB630F1}"/>
+              </a:ext>
+            </a:extLst>
+          </p:cNvPr>
+          <p:cNvSpPr/>
+          <p:nvPr/>
+        </p:nvSpPr>
+        <p:spPr>
+          <a:xfrm rot="5400000">
+            <a:off x="2414393" y="973788"/>
+            <a:ext cx="601465" cy="679785"/>
+          </a:xfrm>
+          <a:prstGeom prst="rightArrow">
+            <a:avLst/>
+          </a:prstGeom>
+        </p:spPr>
+        <p:style>
+          <a:lnRef idx="0">
+            <a:schemeClr val="accent1"/>
+          </a:lnRef>
+          <a:fillRef idx="3">
+            <a:schemeClr val="accent1"/>
+          </a:fillRef>
+          <a:effectRef idx="3">
+            <a:schemeClr val="accent1"/>
+          </a:effectRef>
+          <a:fontRef idx="minor">
+            <a:schemeClr val="lt1"/>
+          </a:fontRef>
+        </p:style>
+        <p:txBody>
+          <a:bodyPr rtlCol="0" anchor="ctr"/>
+          <a:lstStyle/>
+          <a:p>
+            <a:pPr algn="ctr"/>
+            <a:endParaRPr lang="fr-FR"/>
+          </a:p>
+        </p:txBody>
+      </p:sp>
+      <p:sp>
+        <p:nvSpPr>
+          <p:cNvPr id="10" name="Flèche : droite 9">
+            <a:extLst>
+              <a:ext uri="{FF2B5EF4-FFF2-40B4-BE49-F238E27FC236}">
+                <a16:creationId xmlns:a16="http://schemas.microsoft.com/office/drawing/2014/main" id="{A7F3FFF9-AD7A-46EC-B75C-F51660EE4D2C}"/>
+              </a:ext>
+            </a:extLst>
+          </p:cNvPr>
+          <p:cNvSpPr/>
+          <p:nvPr/>
+        </p:nvSpPr>
+        <p:spPr>
+          <a:xfrm rot="5400000">
+            <a:off x="2414391" y="2458356"/>
+            <a:ext cx="601465" cy="679785"/>
+          </a:xfrm>
+          <a:prstGeom prst="rightArrow">
+            <a:avLst/>
+          </a:prstGeom>
+        </p:spPr>
+        <p:style>
+          <a:lnRef idx="0">
+            <a:schemeClr val="accent1"/>
+          </a:lnRef>
+          <a:fillRef idx="3">
+            <a:schemeClr val="accent1"/>
+          </a:fillRef>
+          <a:effectRef idx="3">
+            <a:schemeClr val="accent1"/>
+          </a:effectRef>
+          <a:fontRef idx="minor">
+            <a:schemeClr val="lt1"/>
+          </a:fontRef>
+        </p:style>
+        <p:txBody>
+          <a:bodyPr rtlCol="0" anchor="ctr"/>
+          <a:lstStyle/>
+          <a:p>
+            <a:pPr algn="ctr"/>
+            <a:endParaRPr lang="fr-FR"/>
+          </a:p>
+        </p:txBody>
+      </p:sp>
+      <p:sp>
+        <p:nvSpPr>
+          <p:cNvPr id="11" name="Flèche : droite 10">
+            <a:extLst>
+              <a:ext uri="{FF2B5EF4-FFF2-40B4-BE49-F238E27FC236}">
+                <a16:creationId xmlns:a16="http://schemas.microsoft.com/office/drawing/2014/main" id="{B619BBDB-177F-4C41-A924-C5D7E30A8BC4}"/>
+              </a:ext>
+            </a:extLst>
+          </p:cNvPr>
+          <p:cNvSpPr/>
+          <p:nvPr/>
+        </p:nvSpPr>
+        <p:spPr>
+          <a:xfrm rot="5400000">
+            <a:off x="2414392" y="3942924"/>
+            <a:ext cx="601465" cy="679785"/>
+          </a:xfrm>
+          <a:prstGeom prst="rightArrow">
+            <a:avLst/>
+          </a:prstGeom>
+        </p:spPr>
+        <p:style>
+          <a:lnRef idx="0">
+            <a:schemeClr val="accent1"/>
+          </a:lnRef>
+          <a:fillRef idx="3">
+            <a:schemeClr val="accent1"/>
+          </a:fillRef>
+          <a:effectRef idx="3">
+            <a:schemeClr val="accent1"/>
+          </a:effectRef>
+          <a:fontRef idx="minor">
+            <a:schemeClr val="lt1"/>
+          </a:fontRef>
+        </p:style>
+        <p:txBody>
+          <a:bodyPr rtlCol="0" anchor="ctr"/>
+          <a:lstStyle/>
+          <a:p>
+            <a:pPr algn="ctr"/>
+            <a:endParaRPr lang="fr-FR"/>
+          </a:p>
+        </p:txBody>
+      </p:sp>
+      <p:sp>
+        <p:nvSpPr>
+          <p:cNvPr id="12" name="ZoneTexte 11">
+            <a:extLst>
+              <a:ext uri="{FF2B5EF4-FFF2-40B4-BE49-F238E27FC236}">
+                <a16:creationId xmlns:a16="http://schemas.microsoft.com/office/drawing/2014/main" id="{17BC2253-962A-4CEE-BB4B-BE8542DFE870}"/>
+              </a:ext>
+            </a:extLst>
+          </p:cNvPr>
+          <p:cNvSpPr txBox="1"/>
+          <p:nvPr/>
+        </p:nvSpPr>
+        <p:spPr>
+          <a:xfrm>
+            <a:off x="3055016" y="1052769"/>
+            <a:ext cx="2159669" cy="369332"/>
+          </a:xfrm>
+          <a:prstGeom prst="rect">
+            <a:avLst/>
+          </a:prstGeom>
+          <a:noFill/>
+        </p:spPr>
+        <p:txBody>
+          <a:bodyPr wrap="square" rtlCol="0">
+            <a:spAutoFit/>
+          </a:bodyPr>
+          <a:lstStyle/>
+          <a:p>
+            <a:r>
+              <a:rPr lang="fr-FR" noProof="1">
+                <a:latin typeface="Courier New" panose="02070309020205020404" pitchFamily="49" charset="0"/>
+                <a:cs typeface="Courier New" panose="02070309020205020404" pitchFamily="49" charset="0"/>
+              </a:rPr>
+              <a:t>make</a:t>
+            </a:r>
+          </a:p>
+        </p:txBody>
+      </p:sp>
+      <p:sp>
+        <p:nvSpPr>
+          <p:cNvPr id="13" name="ZoneTexte 12">
+            <a:extLst>
+              <a:ext uri="{FF2B5EF4-FFF2-40B4-BE49-F238E27FC236}">
+                <a16:creationId xmlns:a16="http://schemas.microsoft.com/office/drawing/2014/main" id="{1569D71F-00F9-4137-A927-4002A9465297}"/>
+              </a:ext>
+            </a:extLst>
+          </p:cNvPr>
+          <p:cNvSpPr txBox="1"/>
+          <p:nvPr/>
+        </p:nvSpPr>
+        <p:spPr>
+          <a:xfrm>
+            <a:off x="3055015" y="2589373"/>
+            <a:ext cx="2159669" cy="369332"/>
+          </a:xfrm>
+          <a:prstGeom prst="rect">
+            <a:avLst/>
+          </a:prstGeom>
+          <a:noFill/>
+        </p:spPr>
+        <p:txBody>
+          <a:bodyPr wrap="square" rtlCol="0">
+            <a:spAutoFit/>
+          </a:bodyPr>
+          <a:lstStyle/>
+          <a:p>
+            <a:r>
+              <a:rPr lang="fr-FR" noProof="1">
+                <a:latin typeface="Courier New" panose="02070309020205020404" pitchFamily="49" charset="0"/>
+                <a:cs typeface="Courier New" panose="02070309020205020404" pitchFamily="49" charset="0"/>
+              </a:rPr>
+              <a:t>kos-strip</a:t>
+            </a:r>
+          </a:p>
+        </p:txBody>
+      </p:sp>
+      <p:sp>
+        <p:nvSpPr>
+          <p:cNvPr id="14" name="ZoneTexte 13">
+            <a:extLst>
+              <a:ext uri="{FF2B5EF4-FFF2-40B4-BE49-F238E27FC236}">
+                <a16:creationId xmlns:a16="http://schemas.microsoft.com/office/drawing/2014/main" id="{EFEE0035-0CFD-49ED-A076-41455EB971F6}"/>
+              </a:ext>
+            </a:extLst>
+          </p:cNvPr>
+          <p:cNvSpPr txBox="1"/>
+          <p:nvPr/>
+        </p:nvSpPr>
+        <p:spPr>
+          <a:xfrm>
+            <a:off x="3055015" y="4063053"/>
+            <a:ext cx="2159669" cy="369332"/>
+          </a:xfrm>
+          <a:prstGeom prst="rect">
+            <a:avLst/>
+          </a:prstGeom>
+          <a:noFill/>
+        </p:spPr>
+        <p:txBody>
+          <a:bodyPr wrap="square" rtlCol="0">
+            <a:spAutoFit/>
+          </a:bodyPr>
+          <a:lstStyle/>
+          <a:p>
+            <a:r>
+              <a:rPr lang="fr-FR" dirty="0">
+                <a:latin typeface="Courier New" panose="02070309020205020404" pitchFamily="49" charset="0"/>
+                <a:cs typeface="Courier New" panose="02070309020205020404" pitchFamily="49" charset="0"/>
+              </a:rPr>
+              <a:t>scramble</a:t>
+            </a:r>
+          </a:p>
+        </p:txBody>
+      </p:sp>
+      <p:sp>
+        <p:nvSpPr>
+          <p:cNvPr id="17" name="Rectangle 16">
+            <a:extLst>
+              <a:ext uri="{FF2B5EF4-FFF2-40B4-BE49-F238E27FC236}">
+                <a16:creationId xmlns:a16="http://schemas.microsoft.com/office/drawing/2014/main" id="{5F774441-793F-4E94-BD22-BE029F7EFC26}"/>
+              </a:ext>
+            </a:extLst>
+          </p:cNvPr>
+          <p:cNvSpPr/>
+          <p:nvPr/>
+        </p:nvSpPr>
+        <p:spPr>
+          <a:xfrm>
+            <a:off x="2778790" y="6193713"/>
+            <a:ext cx="5138487" cy="500775"/>
+          </a:xfrm>
+          <a:prstGeom prst="rect">
+            <a:avLst/>
+          </a:prstGeom>
+        </p:spPr>
+        <p:style>
+          <a:lnRef idx="0">
+            <a:schemeClr val="accent2"/>
+          </a:lnRef>
+          <a:fillRef idx="3">
+            <a:schemeClr val="accent2"/>
+          </a:fillRef>
+          <a:effectRef idx="3">
+            <a:schemeClr val="accent2"/>
+          </a:effectRef>
+          <a:fontRef idx="minor">
+            <a:schemeClr val="lt1"/>
+          </a:fontRef>
+        </p:style>
+        <p:txBody>
+          <a:bodyPr rtlCol="0" anchor="ctr"/>
+          <a:lstStyle/>
+          <a:p>
+            <a:pPr algn="ctr"/>
+            <a:r>
+              <a:rPr lang="fr-FR" b="1" noProof="1">
+                <a:effectLst>
+                  <a:outerShdw blurRad="38100" dist="38100" dir="2700000" algn="tl">
+                    <a:srgbClr val="000000">
+                      <a:alpha val="43137"/>
+                    </a:srgbClr>
+                  </a:outerShdw>
+                </a:effectLst>
+              </a:rPr>
+              <a:t>Sega Dreamcast Bootable Disc</a:t>
+            </a:r>
+            <a:endParaRPr lang="fr-FR" sz="1200" noProof="1"/>
+          </a:p>
+        </p:txBody>
+      </p:sp>
+      <p:sp>
+        <p:nvSpPr>
+          <p:cNvPr id="19" name="Flèche : droite 18">
+            <a:extLst>
+              <a:ext uri="{FF2B5EF4-FFF2-40B4-BE49-F238E27FC236}">
+                <a16:creationId xmlns:a16="http://schemas.microsoft.com/office/drawing/2014/main" id="{A452874B-D4E2-42B1-81B1-6F033664D8A2}"/>
+              </a:ext>
+            </a:extLst>
+          </p:cNvPr>
+          <p:cNvSpPr/>
+          <p:nvPr/>
+        </p:nvSpPr>
+        <p:spPr>
+          <a:xfrm rot="5400000">
+            <a:off x="6135160" y="5454391"/>
+            <a:ext cx="601465" cy="679785"/>
+          </a:xfrm>
+          <a:prstGeom prst="rightArrow">
+            <a:avLst/>
+          </a:prstGeom>
+        </p:spPr>
+        <p:style>
+          <a:lnRef idx="0">
+            <a:schemeClr val="accent4"/>
+          </a:lnRef>
+          <a:fillRef idx="3">
+            <a:schemeClr val="accent4"/>
+          </a:fillRef>
+          <a:effectRef idx="3">
+            <a:schemeClr val="accent4"/>
+          </a:effectRef>
+          <a:fontRef idx="minor">
+            <a:schemeClr val="lt1"/>
+          </a:fontRef>
+        </p:style>
+        <p:txBody>
+          <a:bodyPr rtlCol="0" anchor="ctr"/>
+          <a:lstStyle/>
+          <a:p>
+            <a:pPr algn="ctr"/>
+            <a:endParaRPr lang="fr-FR"/>
+          </a:p>
+        </p:txBody>
+      </p:sp>
+      <p:sp>
+        <p:nvSpPr>
+          <p:cNvPr id="20" name="Flèche : droite 19">
+            <a:extLst>
+              <a:ext uri="{FF2B5EF4-FFF2-40B4-BE49-F238E27FC236}">
+                <a16:creationId xmlns:a16="http://schemas.microsoft.com/office/drawing/2014/main" id="{A0DA2E67-590A-439E-A130-93454E213B20}"/>
+              </a:ext>
+            </a:extLst>
+          </p:cNvPr>
+          <p:cNvSpPr/>
+          <p:nvPr/>
+        </p:nvSpPr>
+        <p:spPr>
+          <a:xfrm rot="5400000">
+            <a:off x="3834116" y="5454392"/>
+            <a:ext cx="601465" cy="679785"/>
+          </a:xfrm>
+          <a:prstGeom prst="rightArrow">
+            <a:avLst/>
+          </a:prstGeom>
+        </p:spPr>
+        <p:style>
+          <a:lnRef idx="0">
+            <a:schemeClr val="accent1"/>
+          </a:lnRef>
+          <a:fillRef idx="3">
+            <a:schemeClr val="accent1"/>
+          </a:fillRef>
+          <a:effectRef idx="3">
+            <a:schemeClr val="accent1"/>
+          </a:effectRef>
+          <a:fontRef idx="minor">
+            <a:schemeClr val="lt1"/>
+          </a:fontRef>
+        </p:style>
+        <p:txBody>
+          <a:bodyPr rtlCol="0" anchor="ctr"/>
+          <a:lstStyle/>
+          <a:p>
+            <a:pPr algn="ctr"/>
+            <a:endParaRPr lang="fr-FR"/>
+          </a:p>
+        </p:txBody>
+      </p:sp>
+    </p:spTree>
+    <p:extLst>
+      <p:ext uri="{BB962C8B-B14F-4D97-AF65-F5344CB8AC3E}">
+        <p14:creationId xmlns:p14="http://schemas.microsoft.com/office/powerpoint/2010/main" val="101079525"/>
+      </p:ext>
+    </p:extLst>
+  </p:cSld>
+  <p:clrMapOvr>
+    <a:masterClrMapping/>
+  </p:clrMapOvr>
+</p:sld>
+</file>
+
 <file path=ppt/theme/theme1.xml><?xml version="1.0" encoding="utf-8"?>
 <a:theme xmlns:a="http://schemas.openxmlformats.org/drawingml/2006/main" name="Thème Office">
   <a:themeElements>

</xml_diff>

<commit_message>
Major update on the help system.
</commit_message>
<xml_diff>
--- a/rsrc/dreamsdk.pptx
+++ b/rsrc/dreamsdk.pptx
@@ -260,7 +260,7 @@
           <a:p>
             <a:fld id="{2AF15FF3-8856-4AE4-97CF-0F91F701267A}" type="datetimeFigureOut">
               <a:rPr lang="fr-FR" smtClean="0"/>
-              <a:t>19/11/2018</a:t>
+              <a:t>25/02/2019</a:t>
             </a:fld>
             <a:endParaRPr lang="fr-FR" dirty="0"/>
           </a:p>
@@ -458,7 +458,7 @@
           <a:p>
             <a:fld id="{2AF15FF3-8856-4AE4-97CF-0F91F701267A}" type="datetimeFigureOut">
               <a:rPr lang="fr-FR" smtClean="0"/>
-              <a:t>19/11/2018</a:t>
+              <a:t>25/02/2019</a:t>
             </a:fld>
             <a:endParaRPr lang="fr-FR" dirty="0"/>
           </a:p>
@@ -666,7 +666,7 @@
           <a:p>
             <a:fld id="{2AF15FF3-8856-4AE4-97CF-0F91F701267A}" type="datetimeFigureOut">
               <a:rPr lang="fr-FR" smtClean="0"/>
-              <a:t>19/11/2018</a:t>
+              <a:t>25/02/2019</a:t>
             </a:fld>
             <a:endParaRPr lang="fr-FR" dirty="0"/>
           </a:p>
@@ -864,7 +864,7 @@
           <a:p>
             <a:fld id="{2AF15FF3-8856-4AE4-97CF-0F91F701267A}" type="datetimeFigureOut">
               <a:rPr lang="fr-FR" smtClean="0"/>
-              <a:t>19/11/2018</a:t>
+              <a:t>25/02/2019</a:t>
             </a:fld>
             <a:endParaRPr lang="fr-FR" dirty="0"/>
           </a:p>
@@ -1139,7 +1139,7 @@
           <a:p>
             <a:fld id="{2AF15FF3-8856-4AE4-97CF-0F91F701267A}" type="datetimeFigureOut">
               <a:rPr lang="fr-FR" smtClean="0"/>
-              <a:t>19/11/2018</a:t>
+              <a:t>25/02/2019</a:t>
             </a:fld>
             <a:endParaRPr lang="fr-FR" dirty="0"/>
           </a:p>
@@ -1404,7 +1404,7 @@
           <a:p>
             <a:fld id="{2AF15FF3-8856-4AE4-97CF-0F91F701267A}" type="datetimeFigureOut">
               <a:rPr lang="fr-FR" smtClean="0"/>
-              <a:t>19/11/2018</a:t>
+              <a:t>25/02/2019</a:t>
             </a:fld>
             <a:endParaRPr lang="fr-FR" dirty="0"/>
           </a:p>
@@ -1816,7 +1816,7 @@
           <a:p>
             <a:fld id="{2AF15FF3-8856-4AE4-97CF-0F91F701267A}" type="datetimeFigureOut">
               <a:rPr lang="fr-FR" smtClean="0"/>
-              <a:t>19/11/2018</a:t>
+              <a:t>25/02/2019</a:t>
             </a:fld>
             <a:endParaRPr lang="fr-FR" dirty="0"/>
           </a:p>
@@ -1957,7 +1957,7 @@
           <a:p>
             <a:fld id="{2AF15FF3-8856-4AE4-97CF-0F91F701267A}" type="datetimeFigureOut">
               <a:rPr lang="fr-FR" smtClean="0"/>
-              <a:t>19/11/2018</a:t>
+              <a:t>25/02/2019</a:t>
             </a:fld>
             <a:endParaRPr lang="fr-FR" dirty="0"/>
           </a:p>
@@ -2070,7 +2070,7 @@
           <a:p>
             <a:fld id="{2AF15FF3-8856-4AE4-97CF-0F91F701267A}" type="datetimeFigureOut">
               <a:rPr lang="fr-FR" smtClean="0"/>
-              <a:t>19/11/2018</a:t>
+              <a:t>25/02/2019</a:t>
             </a:fld>
             <a:endParaRPr lang="fr-FR" dirty="0"/>
           </a:p>
@@ -2381,7 +2381,7 @@
           <a:p>
             <a:fld id="{2AF15FF3-8856-4AE4-97CF-0F91F701267A}" type="datetimeFigureOut">
               <a:rPr lang="fr-FR" smtClean="0"/>
-              <a:t>19/11/2018</a:t>
+              <a:t>25/02/2019</a:t>
             </a:fld>
             <a:endParaRPr lang="fr-FR" dirty="0"/>
           </a:p>
@@ -2669,7 +2669,7 @@
           <a:p>
             <a:fld id="{2AF15FF3-8856-4AE4-97CF-0F91F701267A}" type="datetimeFigureOut">
               <a:rPr lang="fr-FR" smtClean="0"/>
-              <a:t>19/11/2018</a:t>
+              <a:t>25/02/2019</a:t>
             </a:fld>
             <a:endParaRPr lang="fr-FR" dirty="0"/>
           </a:p>
@@ -2910,7 +2910,7 @@
           <a:p>
             <a:fld id="{2AF15FF3-8856-4AE4-97CF-0F91F701267A}" type="datetimeFigureOut">
               <a:rPr lang="fr-FR" smtClean="0"/>
-              <a:t>19/11/2018</a:t>
+              <a:t>25/02/2019</a:t>
             </a:fld>
             <a:endParaRPr lang="fr-FR" dirty="0"/>
           </a:p>
@@ -4516,7 +4516,7 @@
         <p:spPr>
           <a:xfrm>
             <a:off x="3055016" y="1052769"/>
-            <a:ext cx="2159669" cy="369332"/>
+            <a:ext cx="2701088" cy="369332"/>
           </a:xfrm>
           <a:prstGeom prst="rect">
             <a:avLst/>
@@ -4534,7 +4534,7 @@
                 <a:latin typeface="Courier New" panose="02070309020205020404" pitchFamily="49" charset="0"/>
                 <a:cs typeface="Courier New" panose="02070309020205020404" pitchFamily="49" charset="0"/>
               </a:rPr>
-              <a:t>make</a:t>
+              <a:t>make (make dist)</a:t>
             </a:r>
           </a:p>
         </p:txBody>
@@ -4572,7 +4572,7 @@
                 <a:latin typeface="Courier New" panose="02070309020205020404" pitchFamily="49" charset="0"/>
                 <a:cs typeface="Courier New" panose="02070309020205020404" pitchFamily="49" charset="0"/>
               </a:rPr>
-              <a:t>kos-strip</a:t>
+              <a:t>elf2bin</a:t>
             </a:r>
           </a:p>
         </p:txBody>
@@ -4756,6 +4756,82 @@
           <a:p>
             <a:pPr algn="ctr"/>
             <a:endParaRPr lang="fr-FR"/>
+          </a:p>
+        </p:txBody>
+      </p:sp>
+      <p:sp>
+        <p:nvSpPr>
+          <p:cNvPr id="16" name="ZoneTexte 15">
+            <a:extLst>
+              <a:ext uri="{FF2B5EF4-FFF2-40B4-BE49-F238E27FC236}">
+                <a16:creationId xmlns:a16="http://schemas.microsoft.com/office/drawing/2014/main" id="{9BF8912E-9A0C-44AD-8F8F-3DBC09EE22E5}"/>
+              </a:ext>
+            </a:extLst>
+          </p:cNvPr>
+          <p:cNvSpPr txBox="1"/>
+          <p:nvPr/>
+        </p:nvSpPr>
+        <p:spPr>
+          <a:xfrm>
+            <a:off x="7642054" y="4098150"/>
+            <a:ext cx="1366585" cy="369332"/>
+          </a:xfrm>
+          <a:prstGeom prst="rect">
+            <a:avLst/>
+          </a:prstGeom>
+          <a:noFill/>
+        </p:spPr>
+        <p:txBody>
+          <a:bodyPr wrap="square" rtlCol="0">
+            <a:spAutoFit/>
+          </a:bodyPr>
+          <a:lstStyle/>
+          <a:p>
+            <a:r>
+              <a:rPr lang="fr-FR" dirty="0">
+                <a:latin typeface="Courier New" panose="02070309020205020404" pitchFamily="49" charset="0"/>
+                <a:cs typeface="Courier New" panose="02070309020205020404" pitchFamily="49" charset="0"/>
+              </a:rPr>
+              <a:t>ipcreate</a:t>
+            </a:r>
+          </a:p>
+        </p:txBody>
+      </p:sp>
+      <p:sp>
+        <p:nvSpPr>
+          <p:cNvPr id="18" name="ZoneTexte 17">
+            <a:extLst>
+              <a:ext uri="{FF2B5EF4-FFF2-40B4-BE49-F238E27FC236}">
+                <a16:creationId xmlns:a16="http://schemas.microsoft.com/office/drawing/2014/main" id="{3661433A-BDFB-4B1A-99F2-669AC4DE29CE}"/>
+              </a:ext>
+            </a:extLst>
+          </p:cNvPr>
+          <p:cNvSpPr txBox="1"/>
+          <p:nvPr/>
+        </p:nvSpPr>
+        <p:spPr>
+          <a:xfrm>
+            <a:off x="4664740" y="5725684"/>
+            <a:ext cx="1366585" cy="369332"/>
+          </a:xfrm>
+          <a:prstGeom prst="rect">
+            <a:avLst/>
+          </a:prstGeom>
+          <a:noFill/>
+        </p:spPr>
+        <p:txBody>
+          <a:bodyPr wrap="square" rtlCol="0">
+            <a:spAutoFit/>
+          </a:bodyPr>
+          <a:lstStyle/>
+          <a:p>
+            <a:r>
+              <a:rPr lang="fr-FR" dirty="0">
+                <a:latin typeface="Courier New" panose="02070309020205020404" pitchFamily="49" charset="0"/>
+                <a:cs typeface="Courier New" panose="02070309020205020404" pitchFamily="49" charset="0"/>
+              </a:rPr>
+              <a:t>makedisc</a:t>
+            </a:r>
           </a:p>
         </p:txBody>
       </p:sp>

</xml_diff>